<commit_message>
made an edit to PM review slides
</commit_message>
<xml_diff>
--- a/presentations/Week 7 PM Review.pptx
+++ b/presentations/Week 7 PM Review.pptx
@@ -292,7 +292,7 @@
       </p15:sldGuideLst>
     </p:ext>
     <p:ext uri="http://customooxmlschemas.google.com/">
-      <go:slidesCustomData xmlns:go="http://customooxmlschemas.google.com/" xmlns:p15="http://schemas.microsoft.com/office/powerpoint/2012/main" xmlns:p14="http://schemas.microsoft.com/office/powerpoint/2010/main" xmlns:com="http://schemas.openxmlformats.org/drawingml/2006/compatibility" xmlns:pvml="urn:schemas-microsoft-com:office:powerpoint" xmlns:v="urn:schemas-microsoft-com:vml" xmlns:o="urn:schemas-microsoft-com:office:office" xmlns:dgm="http://schemas.openxmlformats.org/drawingml/2006/diagram" xmlns:c="http://schemas.openxmlformats.org/drawingml/2006/chart" xmlns:mv="urn:schemas-microsoft-com:mac:vml" xmlns:mc="http://schemas.openxmlformats.org/markup-compatibility/2006" xmlns="" r:id="rId28" roundtripDataSignature="AMtx7mgiwejQq+aOpyBs2zGMnN1ShMDgpw=="/>
+      <go:slidesCustomData xmlns="" xmlns:mc="http://schemas.openxmlformats.org/markup-compatibility/2006" xmlns:mv="urn:schemas-microsoft-com:mac:vml" xmlns:c="http://schemas.openxmlformats.org/drawingml/2006/chart" xmlns:dgm="http://schemas.openxmlformats.org/drawingml/2006/diagram" xmlns:o="urn:schemas-microsoft-com:office:office" xmlns:v="urn:schemas-microsoft-com:vml" xmlns:pvml="urn:schemas-microsoft-com:office:powerpoint" xmlns:com="http://schemas.openxmlformats.org/drawingml/2006/compatibility" xmlns:p14="http://schemas.microsoft.com/office/powerpoint/2010/main" xmlns:p15="http://schemas.microsoft.com/office/powerpoint/2012/main" xmlns:go="http://customooxmlschemas.google.com/" r:id="rId28" roundtripDataSignature="AMtx7mgiwejQq+aOpyBs2zGMnN1ShMDgpw=="/>
     </p:ext>
   </p:extLst>
 </p:presentation>
@@ -910,8 +910,8 @@
         </p:nvSpPr>
         <p:spPr>
           <a:xfrm>
-            <a:off x="4572675" y="771525"/>
-            <a:ext cx="9144300" cy="3857700"/>
+            <a:off x="6572250" y="771525"/>
+            <a:ext cx="5145088" cy="3857625"/>
           </a:xfrm>
           <a:custGeom>
             <a:avLst/>
@@ -2968,8 +2968,8 @@
         </p:nvSpPr>
         <p:spPr>
           <a:xfrm>
-            <a:off x="4572675" y="771525"/>
-            <a:ext cx="9144300" cy="3857700"/>
+            <a:off x="6572250" y="771525"/>
+            <a:ext cx="5145088" cy="3857625"/>
           </a:xfrm>
           <a:custGeom>
             <a:avLst/>
@@ -8837,7 +8837,7 @@
         <p:spPr>
           <a:xfrm>
             <a:off x="238225" y="1212283"/>
-            <a:ext cx="2835900" cy="546300"/>
+            <a:ext cx="4619100" cy="546300"/>
           </a:xfrm>
           <a:prstGeom prst="rect">
             <a:avLst/>
@@ -8863,7 +8863,7 @@
               <a:buNone/>
             </a:pPr>
             <a:r>
-              <a:rPr lang="en-SG" sz="1700">
+              <a:rPr lang="en-SG" sz="1700" dirty="0">
                 <a:solidFill>
                   <a:srgbClr val="888888"/>
                 </a:solidFill>
@@ -8872,9 +8872,9 @@
                 <a:cs typeface="Arial Black"/>
                 <a:sym typeface="Arial Black"/>
               </a:rPr>
-              <a:t>Iteration 3 - 5 days</a:t>
-            </a:r>
-            <a:endParaRPr sz="1700">
+              <a:t>Iteration 3 - 5 days (2 paths)</a:t>
+            </a:r>
+            <a:endParaRPr sz="1700" dirty="0">
               <a:solidFill>
                 <a:srgbClr val="888888"/>
               </a:solidFill>
@@ -9015,7 +9015,7 @@
               <a:buNone/>
             </a:pPr>
             <a:r>
-              <a:rPr lang="en-SG" sz="1300">
+              <a:rPr lang="en-SG" sz="1300" dirty="0">
                 <a:latin typeface="Arimo"/>
                 <a:ea typeface="Arimo"/>
                 <a:cs typeface="Arimo"/>
@@ -9023,7 +9023,7 @@
               </a:rPr>
               <a:t>3.1 Write test cases for JSON API</a:t>
             </a:r>
-            <a:endParaRPr sz="1300">
+            <a:endParaRPr sz="1300" dirty="0">
               <a:latin typeface="Arimo"/>
               <a:ea typeface="Arimo"/>
               <a:cs typeface="Arimo"/>
@@ -9041,7 +9041,7 @@
               <a:buNone/>
             </a:pPr>
             <a:r>
-              <a:rPr lang="en-SG" sz="1300" b="1">
+              <a:rPr lang="en-SG" sz="1300" b="1" dirty="0">
                 <a:latin typeface="Arimo"/>
                 <a:ea typeface="Arimo"/>
                 <a:cs typeface="Arimo"/>
@@ -9049,7 +9049,7 @@
               </a:rPr>
               <a:t>1 day</a:t>
             </a:r>
-            <a:endParaRPr sz="1300" b="1">
+            <a:endParaRPr sz="1300" b="1" dirty="0">
               <a:latin typeface="Arimo"/>
               <a:ea typeface="Arimo"/>
               <a:cs typeface="Arimo"/>
@@ -17215,8 +17215,8 @@
         </p:nvSpPr>
         <p:spPr>
           <a:xfrm>
-            <a:off x="238225" y="1212283"/>
-            <a:ext cx="2835900" cy="546300"/>
+            <a:off x="238224" y="1212283"/>
+            <a:ext cx="3551455" cy="546300"/>
           </a:xfrm>
           <a:prstGeom prst="rect">
             <a:avLst/>
@@ -17242,7 +17242,7 @@
               <a:buNone/>
             </a:pPr>
             <a:r>
-              <a:rPr lang="en-SG" sz="1700">
+              <a:rPr lang="en-SG" sz="1700" dirty="0">
                 <a:solidFill>
                   <a:srgbClr val="888888"/>
                 </a:solidFill>
@@ -17251,9 +17251,9 @@
                 <a:cs typeface="Arial Black"/>
                 <a:sym typeface="Arial Black"/>
               </a:rPr>
-              <a:t>Iteration 2 - 6 days</a:t>
-            </a:r>
-            <a:endParaRPr sz="1700">
+              <a:t>Iteration 2 - 6 days (2 paths)</a:t>
+            </a:r>
+            <a:endParaRPr sz="1700" dirty="0">
               <a:solidFill>
                 <a:srgbClr val="888888"/>
               </a:solidFill>

</xml_diff>